<commit_message>
Made some minor changes to presentation.
</commit_message>
<xml_diff>
--- a/docs/UWPresentation.pptx
+++ b/docs/UWPresentation.pptx
@@ -1,6 +1,6 @@
 
 <file path=ppt/presentation.xml><?xml version="1.0" encoding="utf-8"?>
-<p:presentation xmlns:a="http://schemas.openxmlformats.org/drawingml/2006/main" xmlns:r="http://schemas.openxmlformats.org/officeDocument/2006/relationships" xmlns:mc="http://schemas.openxmlformats.org/markup-compatibility/2006" xmlns:mv="urn:schemas-microsoft-com:mac:vml" xmlns:p="http://schemas.openxmlformats.org/presentationml/2006/main" mc:Ignorable="mv" mc:PreserveAttributes="mv:*" saveSubsetFonts="1" autoCompressPictures="0">
+<p:presentation xmlns:a="http://schemas.openxmlformats.org/drawingml/2006/main" xmlns:r="http://schemas.openxmlformats.org/officeDocument/2006/relationships" xmlns:p="http://schemas.openxmlformats.org/presentationml/2006/main" saveSubsetFonts="1" autoCompressPictures="0">
   <p:sldMasterIdLst>
     <p:sldMasterId id="2147483648" r:id="rId1"/>
   </p:sldMasterIdLst>
@@ -125,7 +125,7 @@
 </file>
 
 <file path=ppt/notesMasters/notesMaster1.xml><?xml version="1.0" encoding="utf-8"?>
-<p:notesMaster xmlns:a="http://schemas.openxmlformats.org/drawingml/2006/main" xmlns:r="http://schemas.openxmlformats.org/officeDocument/2006/relationships" xmlns:mc="http://schemas.openxmlformats.org/markup-compatibility/2006" xmlns:mv="urn:schemas-microsoft-com:mac:vml" xmlns:p="http://schemas.openxmlformats.org/presentationml/2006/main" mc:Ignorable="mv" mc:PreserveAttributes="mv:*">
+<p:notesMaster xmlns:a="http://schemas.openxmlformats.org/drawingml/2006/main" xmlns:r="http://schemas.openxmlformats.org/officeDocument/2006/relationships" xmlns:p="http://schemas.openxmlformats.org/presentationml/2006/main">
   <p:cSld>
     <p:bg>
       <p:bgRef idx="1001">
@@ -206,7 +206,7 @@
           <a:p>
             <a:fld id="{C020907F-B408-8544-96B6-75FAE80ABF6A}" type="datetimeFigureOut">
               <a:rPr lang="en-US" smtClean="0"/>
-              <a:t>6/2/13</a:t>
+              <a:t>6/3/2013</a:t>
             </a:fld>
             <a:endParaRPr lang="en-US"/>
           </a:p>
@@ -374,6 +374,11 @@
         </p:txBody>
       </p:sp>
     </p:spTree>
+    <p:extLst>
+      <p:ext uri="{BB962C8B-B14F-4D97-AF65-F5344CB8AC3E}">
+        <p14:creationId xmlns:p14="http://schemas.microsoft.com/office/powerpoint/2010/main" val="373734886"/>
+      </p:ext>
+    </p:extLst>
   </p:cSld>
   <p:clrMap bg1="lt1" tx1="dk1" bg2="lt2" tx2="dk2" accent1="accent1" accent2="accent2" accent3="accent3" accent4="accent4" accent5="accent5" accent6="accent6" hlink="hlink" folHlink="folHlink"/>
   <p:notesStyle>
@@ -472,7 +477,7 @@
 </file>
 
 <file path=ppt/notesSlides/notesSlide1.xml><?xml version="1.0" encoding="utf-8"?>
-<p:notes xmlns:a="http://schemas.openxmlformats.org/drawingml/2006/main" xmlns:r="http://schemas.openxmlformats.org/officeDocument/2006/relationships" xmlns:mc="http://schemas.openxmlformats.org/markup-compatibility/2006" xmlns:mv="urn:schemas-microsoft-com:mac:vml" xmlns:p="http://schemas.openxmlformats.org/presentationml/2006/main" mc:Ignorable="mv" mc:PreserveAttributes="mv:*">
+<p:notes xmlns:a="http://schemas.openxmlformats.org/drawingml/2006/main" xmlns:r="http://schemas.openxmlformats.org/officeDocument/2006/relationships" xmlns:p="http://schemas.openxmlformats.org/presentationml/2006/main">
   <p:cSld>
     <p:spTree>
       <p:nvGrpSpPr>
@@ -553,7 +558,7 @@
 </file>
 
 <file path=ppt/notesSlides/notesSlide2.xml><?xml version="1.0" encoding="utf-8"?>
-<p:notes xmlns:a="http://schemas.openxmlformats.org/drawingml/2006/main" xmlns:r="http://schemas.openxmlformats.org/officeDocument/2006/relationships" xmlns:mc="http://schemas.openxmlformats.org/markup-compatibility/2006" xmlns:mv="urn:schemas-microsoft-com:mac:vml" xmlns:p="http://schemas.openxmlformats.org/presentationml/2006/main" mc:Ignorable="mv" mc:PreserveAttributes="mv:*">
+<p:notes xmlns:a="http://schemas.openxmlformats.org/drawingml/2006/main" xmlns:r="http://schemas.openxmlformats.org/officeDocument/2006/relationships" xmlns:p="http://schemas.openxmlformats.org/presentationml/2006/main">
   <p:cSld>
     <p:spTree>
       <p:nvGrpSpPr>
@@ -634,7 +639,7 @@
 </file>
 
 <file path=ppt/slideLayouts/slideLayout1.xml><?xml version="1.0" encoding="utf-8"?>
-<p:sldLayout xmlns:a="http://schemas.openxmlformats.org/drawingml/2006/main" xmlns:r="http://schemas.openxmlformats.org/officeDocument/2006/relationships" xmlns:mc="http://schemas.openxmlformats.org/markup-compatibility/2006" xmlns:mv="urn:schemas-microsoft-com:mac:vml" xmlns:p="http://schemas.openxmlformats.org/presentationml/2006/main" mc:Ignorable="mv" mc:PreserveAttributes="mv:*" type="title" preserve="1">
+<p:sldLayout xmlns:a="http://schemas.openxmlformats.org/drawingml/2006/main" xmlns:r="http://schemas.openxmlformats.org/officeDocument/2006/relationships" xmlns:p="http://schemas.openxmlformats.org/presentationml/2006/main" type="title" preserve="1">
   <p:cSld name="Title Slide">
     <p:spTree>
       <p:nvGrpSpPr>
@@ -815,7 +820,7 @@
             <a:fld id="{84C897DB-8AE6-B045-A6C9-8649AF97310E}" type="datetimeFigureOut">
               <a:rPr lang="en-US" smtClean="0"/>
               <a:pPr/>
-              <a:t>6/2/13</a:t>
+              <a:t>6/3/2013</a:t>
             </a:fld>
             <a:endParaRPr lang="en-US"/>
           </a:p>
@@ -873,7 +878,7 @@
 </file>
 
 <file path=ppt/slideLayouts/slideLayout10.xml><?xml version="1.0" encoding="utf-8"?>
-<p:sldLayout xmlns:a="http://schemas.openxmlformats.org/drawingml/2006/main" xmlns:r="http://schemas.openxmlformats.org/officeDocument/2006/relationships" xmlns:mc="http://schemas.openxmlformats.org/markup-compatibility/2006" xmlns:mv="urn:schemas-microsoft-com:mac:vml" xmlns:p="http://schemas.openxmlformats.org/presentationml/2006/main" mc:Ignorable="mv" mc:PreserveAttributes="mv:*" type="vertTx" preserve="1">
+<p:sldLayout xmlns:a="http://schemas.openxmlformats.org/drawingml/2006/main" xmlns:r="http://schemas.openxmlformats.org/officeDocument/2006/relationships" xmlns:p="http://schemas.openxmlformats.org/presentationml/2006/main" type="vertTx" preserve="1">
   <p:cSld name="Title and Vertical Text">
     <p:spTree>
       <p:nvGrpSpPr>
@@ -982,7 +987,7 @@
             <a:fld id="{84C897DB-8AE6-B045-A6C9-8649AF97310E}" type="datetimeFigureOut">
               <a:rPr lang="en-US" smtClean="0"/>
               <a:pPr/>
-              <a:t>6/2/13</a:t>
+              <a:t>6/3/2013</a:t>
             </a:fld>
             <a:endParaRPr lang="en-US"/>
           </a:p>
@@ -1040,7 +1045,7 @@
 </file>
 
 <file path=ppt/slideLayouts/slideLayout11.xml><?xml version="1.0" encoding="utf-8"?>
-<p:sldLayout xmlns:a="http://schemas.openxmlformats.org/drawingml/2006/main" xmlns:r="http://schemas.openxmlformats.org/officeDocument/2006/relationships" xmlns:mc="http://schemas.openxmlformats.org/markup-compatibility/2006" xmlns:mv="urn:schemas-microsoft-com:mac:vml" xmlns:p="http://schemas.openxmlformats.org/presentationml/2006/main" mc:Ignorable="mv" mc:PreserveAttributes="mv:*" type="vertTitleAndTx" preserve="1">
+<p:sldLayout xmlns:a="http://schemas.openxmlformats.org/drawingml/2006/main" xmlns:r="http://schemas.openxmlformats.org/officeDocument/2006/relationships" xmlns:p="http://schemas.openxmlformats.org/presentationml/2006/main" type="vertTitleAndTx" preserve="1">
   <p:cSld name="Vertical Title and Text">
     <p:spTree>
       <p:nvGrpSpPr>
@@ -1159,7 +1164,7 @@
             <a:fld id="{84C897DB-8AE6-B045-A6C9-8649AF97310E}" type="datetimeFigureOut">
               <a:rPr lang="en-US" smtClean="0"/>
               <a:pPr/>
-              <a:t>6/2/13</a:t>
+              <a:t>6/3/2013</a:t>
             </a:fld>
             <a:endParaRPr lang="en-US"/>
           </a:p>
@@ -1217,7 +1222,7 @@
 </file>
 
 <file path=ppt/slideLayouts/slideLayout2.xml><?xml version="1.0" encoding="utf-8"?>
-<p:sldLayout xmlns:a="http://schemas.openxmlformats.org/drawingml/2006/main" xmlns:r="http://schemas.openxmlformats.org/officeDocument/2006/relationships" xmlns:mc="http://schemas.openxmlformats.org/markup-compatibility/2006" xmlns:mv="urn:schemas-microsoft-com:mac:vml" xmlns:p="http://schemas.openxmlformats.org/presentationml/2006/main" mc:Ignorable="mv" mc:PreserveAttributes="mv:*" type="obj" preserve="1">
+<p:sldLayout xmlns:a="http://schemas.openxmlformats.org/drawingml/2006/main" xmlns:r="http://schemas.openxmlformats.org/officeDocument/2006/relationships" xmlns:p="http://schemas.openxmlformats.org/presentationml/2006/main" type="obj" preserve="1">
   <p:cSld name="Title and Content">
     <p:spTree>
       <p:nvGrpSpPr>
@@ -1326,7 +1331,7 @@
             <a:fld id="{84C897DB-8AE6-B045-A6C9-8649AF97310E}" type="datetimeFigureOut">
               <a:rPr lang="en-US" smtClean="0"/>
               <a:pPr/>
-              <a:t>6/2/13</a:t>
+              <a:t>6/3/2013</a:t>
             </a:fld>
             <a:endParaRPr lang="en-US"/>
           </a:p>
@@ -1384,7 +1389,7 @@
 </file>
 
 <file path=ppt/slideLayouts/slideLayout3.xml><?xml version="1.0" encoding="utf-8"?>
-<p:sldLayout xmlns:a="http://schemas.openxmlformats.org/drawingml/2006/main" xmlns:r="http://schemas.openxmlformats.org/officeDocument/2006/relationships" xmlns:mc="http://schemas.openxmlformats.org/markup-compatibility/2006" xmlns:mv="urn:schemas-microsoft-com:mac:vml" xmlns:p="http://schemas.openxmlformats.org/presentationml/2006/main" mc:Ignorable="mv" mc:PreserveAttributes="mv:*" type="secHead" preserve="1">
+<p:sldLayout xmlns:a="http://schemas.openxmlformats.org/drawingml/2006/main" xmlns:r="http://schemas.openxmlformats.org/officeDocument/2006/relationships" xmlns:p="http://schemas.openxmlformats.org/presentationml/2006/main" type="secHead" preserve="1">
   <p:cSld name="Section Header">
     <p:spTree>
       <p:nvGrpSpPr>
@@ -1569,7 +1574,7 @@
             <a:fld id="{84C897DB-8AE6-B045-A6C9-8649AF97310E}" type="datetimeFigureOut">
               <a:rPr lang="en-US" smtClean="0"/>
               <a:pPr/>
-              <a:t>6/2/13</a:t>
+              <a:t>6/3/2013</a:t>
             </a:fld>
             <a:endParaRPr lang="en-US"/>
           </a:p>
@@ -1627,7 +1632,7 @@
 </file>
 
 <file path=ppt/slideLayouts/slideLayout4.xml><?xml version="1.0" encoding="utf-8"?>
-<p:sldLayout xmlns:a="http://schemas.openxmlformats.org/drawingml/2006/main" xmlns:r="http://schemas.openxmlformats.org/officeDocument/2006/relationships" xmlns:mc="http://schemas.openxmlformats.org/markup-compatibility/2006" xmlns:mv="urn:schemas-microsoft-com:mac:vml" xmlns:p="http://schemas.openxmlformats.org/presentationml/2006/main" mc:Ignorable="mv" mc:PreserveAttributes="mv:*" type="twoObj" preserve="1">
+<p:sldLayout xmlns:a="http://schemas.openxmlformats.org/drawingml/2006/main" xmlns:r="http://schemas.openxmlformats.org/officeDocument/2006/relationships" xmlns:p="http://schemas.openxmlformats.org/presentationml/2006/main" type="twoObj" preserve="1">
   <p:cSld name="Two Content">
     <p:spTree>
       <p:nvGrpSpPr>
@@ -1854,7 +1859,7 @@
             <a:fld id="{84C897DB-8AE6-B045-A6C9-8649AF97310E}" type="datetimeFigureOut">
               <a:rPr lang="en-US" smtClean="0"/>
               <a:pPr/>
-              <a:t>6/2/13</a:t>
+              <a:t>6/3/2013</a:t>
             </a:fld>
             <a:endParaRPr lang="en-US"/>
           </a:p>
@@ -1912,7 +1917,7 @@
 </file>
 
 <file path=ppt/slideLayouts/slideLayout5.xml><?xml version="1.0" encoding="utf-8"?>
-<p:sldLayout xmlns:a="http://schemas.openxmlformats.org/drawingml/2006/main" xmlns:r="http://schemas.openxmlformats.org/officeDocument/2006/relationships" xmlns:mc="http://schemas.openxmlformats.org/markup-compatibility/2006" xmlns:mv="urn:schemas-microsoft-com:mac:vml" xmlns:p="http://schemas.openxmlformats.org/presentationml/2006/main" mc:Ignorable="mv" mc:PreserveAttributes="mv:*" type="twoTxTwoObj" preserve="1">
+<p:sldLayout xmlns:a="http://schemas.openxmlformats.org/drawingml/2006/main" xmlns:r="http://schemas.openxmlformats.org/officeDocument/2006/relationships" xmlns:p="http://schemas.openxmlformats.org/presentationml/2006/main" type="twoTxTwoObj" preserve="1">
   <p:cSld name="Comparison">
     <p:spTree>
       <p:nvGrpSpPr>
@@ -2273,7 +2278,7 @@
             <a:fld id="{84C897DB-8AE6-B045-A6C9-8649AF97310E}" type="datetimeFigureOut">
               <a:rPr lang="en-US" smtClean="0"/>
               <a:pPr/>
-              <a:t>6/2/13</a:t>
+              <a:t>6/3/2013</a:t>
             </a:fld>
             <a:endParaRPr lang="en-US"/>
           </a:p>
@@ -2331,7 +2336,7 @@
 </file>
 
 <file path=ppt/slideLayouts/slideLayout6.xml><?xml version="1.0" encoding="utf-8"?>
-<p:sldLayout xmlns:a="http://schemas.openxmlformats.org/drawingml/2006/main" xmlns:r="http://schemas.openxmlformats.org/officeDocument/2006/relationships" xmlns:mc="http://schemas.openxmlformats.org/markup-compatibility/2006" xmlns:mv="urn:schemas-microsoft-com:mac:vml" xmlns:p="http://schemas.openxmlformats.org/presentationml/2006/main" mc:Ignorable="mv" mc:PreserveAttributes="mv:*" type="titleOnly" preserve="1">
+<p:sldLayout xmlns:a="http://schemas.openxmlformats.org/drawingml/2006/main" xmlns:r="http://schemas.openxmlformats.org/officeDocument/2006/relationships" xmlns:p="http://schemas.openxmlformats.org/presentationml/2006/main" type="titleOnly" preserve="1">
   <p:cSld name="Title Only">
     <p:spTree>
       <p:nvGrpSpPr>
@@ -2388,7 +2393,7 @@
             <a:fld id="{84C897DB-8AE6-B045-A6C9-8649AF97310E}" type="datetimeFigureOut">
               <a:rPr lang="en-US" smtClean="0"/>
               <a:pPr/>
-              <a:t>6/2/13</a:t>
+              <a:t>6/3/2013</a:t>
             </a:fld>
             <a:endParaRPr lang="en-US"/>
           </a:p>
@@ -2446,7 +2451,7 @@
 </file>
 
 <file path=ppt/slideLayouts/slideLayout7.xml><?xml version="1.0" encoding="utf-8"?>
-<p:sldLayout xmlns:a="http://schemas.openxmlformats.org/drawingml/2006/main" xmlns:r="http://schemas.openxmlformats.org/officeDocument/2006/relationships" xmlns:mc="http://schemas.openxmlformats.org/markup-compatibility/2006" xmlns:mv="urn:schemas-microsoft-com:mac:vml" xmlns:p="http://schemas.openxmlformats.org/presentationml/2006/main" mc:Ignorable="mv" mc:PreserveAttributes="mv:*" type="blank" preserve="1">
+<p:sldLayout xmlns:a="http://schemas.openxmlformats.org/drawingml/2006/main" xmlns:r="http://schemas.openxmlformats.org/officeDocument/2006/relationships" xmlns:p="http://schemas.openxmlformats.org/presentationml/2006/main" type="blank" preserve="1">
   <p:cSld name="Blank">
     <p:spTree>
       <p:nvGrpSpPr>
@@ -2480,7 +2485,7 @@
             <a:fld id="{84C897DB-8AE6-B045-A6C9-8649AF97310E}" type="datetimeFigureOut">
               <a:rPr lang="en-US" smtClean="0"/>
               <a:pPr/>
-              <a:t>6/2/13</a:t>
+              <a:t>6/3/2013</a:t>
             </a:fld>
             <a:endParaRPr lang="en-US"/>
           </a:p>
@@ -2538,7 +2543,7 @@
 </file>
 
 <file path=ppt/slideLayouts/slideLayout8.xml><?xml version="1.0" encoding="utf-8"?>
-<p:sldLayout xmlns:a="http://schemas.openxmlformats.org/drawingml/2006/main" xmlns:r="http://schemas.openxmlformats.org/officeDocument/2006/relationships" xmlns:mc="http://schemas.openxmlformats.org/markup-compatibility/2006" xmlns:mv="urn:schemas-microsoft-com:mac:vml" xmlns:p="http://schemas.openxmlformats.org/presentationml/2006/main" mc:Ignorable="mv" mc:PreserveAttributes="mv:*" type="objTx" preserve="1">
+<p:sldLayout xmlns:a="http://schemas.openxmlformats.org/drawingml/2006/main" xmlns:r="http://schemas.openxmlformats.org/officeDocument/2006/relationships" xmlns:p="http://schemas.openxmlformats.org/presentationml/2006/main" type="objTx" preserve="1">
   <p:cSld name="Content with Caption">
     <p:spTree>
       <p:nvGrpSpPr>
@@ -2754,7 +2759,7 @@
             <a:fld id="{84C897DB-8AE6-B045-A6C9-8649AF97310E}" type="datetimeFigureOut">
               <a:rPr lang="en-US" smtClean="0"/>
               <a:pPr/>
-              <a:t>6/2/13</a:t>
+              <a:t>6/3/2013</a:t>
             </a:fld>
             <a:endParaRPr lang="en-US"/>
           </a:p>
@@ -2812,7 +2817,7 @@
 </file>
 
 <file path=ppt/slideLayouts/slideLayout9.xml><?xml version="1.0" encoding="utf-8"?>
-<p:sldLayout xmlns:a="http://schemas.openxmlformats.org/drawingml/2006/main" xmlns:r="http://schemas.openxmlformats.org/officeDocument/2006/relationships" xmlns:mc="http://schemas.openxmlformats.org/markup-compatibility/2006" xmlns:mv="urn:schemas-microsoft-com:mac:vml" xmlns:p="http://schemas.openxmlformats.org/presentationml/2006/main" mc:Ignorable="mv" mc:PreserveAttributes="mv:*" type="picTx" preserve="1">
+<p:sldLayout xmlns:a="http://schemas.openxmlformats.org/drawingml/2006/main" xmlns:r="http://schemas.openxmlformats.org/officeDocument/2006/relationships" xmlns:p="http://schemas.openxmlformats.org/presentationml/2006/main" type="picTx" preserve="1">
   <p:cSld name="Picture with Caption">
     <p:spTree>
       <p:nvGrpSpPr>
@@ -3004,7 +3009,7 @@
             <a:fld id="{84C897DB-8AE6-B045-A6C9-8649AF97310E}" type="datetimeFigureOut">
               <a:rPr lang="en-US" smtClean="0"/>
               <a:pPr/>
-              <a:t>6/2/13</a:t>
+              <a:t>6/3/2013</a:t>
             </a:fld>
             <a:endParaRPr lang="en-US"/>
           </a:p>
@@ -3062,7 +3067,7 @@
 </file>
 
 <file path=ppt/slideMasters/slideMaster1.xml><?xml version="1.0" encoding="utf-8"?>
-<p:sldMaster xmlns:a="http://schemas.openxmlformats.org/drawingml/2006/main" xmlns:r="http://schemas.openxmlformats.org/officeDocument/2006/relationships" xmlns:mc="http://schemas.openxmlformats.org/markup-compatibility/2006" xmlns:mv="urn:schemas-microsoft-com:mac:vml" xmlns:p="http://schemas.openxmlformats.org/presentationml/2006/main" mc:Ignorable="mv" mc:PreserveAttributes="mv:*">
+<p:sldMaster xmlns:a="http://schemas.openxmlformats.org/drawingml/2006/main" xmlns:r="http://schemas.openxmlformats.org/officeDocument/2006/relationships" xmlns:p="http://schemas.openxmlformats.org/presentationml/2006/main">
   <p:cSld>
     <p:bg>
       <p:bgRef idx="1001">
@@ -3214,7 +3219,7 @@
             <a:fld id="{84C897DB-8AE6-B045-A6C9-8649AF97310E}" type="datetimeFigureOut">
               <a:rPr lang="en-US" smtClean="0"/>
               <a:pPr/>
-              <a:t>6/2/13</a:t>
+              <a:t>6/3/2013</a:t>
             </a:fld>
             <a:endParaRPr lang="en-US"/>
           </a:p>
@@ -3569,7 +3574,7 @@
 </file>
 
 <file path=ppt/slides/slide1.xml><?xml version="1.0" encoding="utf-8"?>
-<p:sld xmlns:a="http://schemas.openxmlformats.org/drawingml/2006/main" xmlns:r="http://schemas.openxmlformats.org/officeDocument/2006/relationships" xmlns:mc="http://schemas.openxmlformats.org/markup-compatibility/2006" xmlns:mv="urn:schemas-microsoft-com:mac:vml" xmlns:p="http://schemas.openxmlformats.org/presentationml/2006/main" mc:Ignorable="mv" mc:PreserveAttributes="mv:*">
+<p:sld xmlns:a="http://schemas.openxmlformats.org/drawingml/2006/main" xmlns:r="http://schemas.openxmlformats.org/officeDocument/2006/relationships" xmlns:p="http://schemas.openxmlformats.org/presentationml/2006/main">
   <p:cSld>
     <p:bg>
       <p:bgPr>
@@ -3605,7 +3610,7 @@
 </file>
 
 <file path=ppt/slides/slide10.xml><?xml version="1.0" encoding="utf-8"?>
-<p:sld xmlns:a="http://schemas.openxmlformats.org/drawingml/2006/main" xmlns:r="http://schemas.openxmlformats.org/officeDocument/2006/relationships" xmlns:mc="http://schemas.openxmlformats.org/markup-compatibility/2006" xmlns:mv="urn:schemas-microsoft-com:mac:vml" xmlns:p="http://schemas.openxmlformats.org/presentationml/2006/main" mc:Ignorable="mv" mc:PreserveAttributes="mv:*">
+<p:sld xmlns:a="http://schemas.openxmlformats.org/drawingml/2006/main" xmlns:r="http://schemas.openxmlformats.org/officeDocument/2006/relationships" xmlns:p="http://schemas.openxmlformats.org/presentationml/2006/main">
   <p:cSld>
     <p:bg>
       <p:bgPr>
@@ -3721,25 +3726,8 @@
                 <a:latin typeface="Bell MT"/>
                 <a:cs typeface="Bell MT"/>
               </a:rPr>
-              <a:t> icon to </a:t>
-            </a:r>
-            <a:r>
-              <a:rPr lang="en-US" dirty="0" smtClean="0">
-                <a:solidFill>
-                  <a:schemeClr val="bg1"/>
-                </a:solidFill>
-                <a:latin typeface="Bell MT"/>
-                <a:cs typeface="Bell MT"/>
-              </a:rPr>
-              <a:t>access current inventory</a:t>
-            </a:r>
-            <a:endParaRPr lang="en-US" dirty="0" smtClean="0">
-              <a:solidFill>
-                <a:schemeClr val="bg1"/>
-              </a:solidFill>
-              <a:latin typeface="Bell MT"/>
-              <a:cs typeface="Bell MT"/>
-            </a:endParaRPr>
+              <a:t> icon to access current inventory</a:t>
+            </a:r>
           </a:p>
           <a:p>
             <a:pPr>
@@ -3788,14 +3776,14 @@
               <a:buChar char="§"/>
             </a:pPr>
             <a:r>
-              <a:rPr lang="en-US" dirty="0" err="1" smtClean="0">
-                <a:solidFill>
-                  <a:schemeClr val="bg1"/>
-                </a:solidFill>
-                <a:latin typeface="Bell MT"/>
-                <a:cs typeface="Bell MT"/>
-              </a:rPr>
-              <a:t>JButtons</a:t>
+              <a:rPr lang="en-US" dirty="0" smtClean="0">
+                <a:solidFill>
+                  <a:schemeClr val="bg1"/>
+                </a:solidFill>
+                <a:latin typeface="Bell MT"/>
+                <a:cs typeface="Bell MT"/>
+              </a:rPr>
+              <a:t>Buttons</a:t>
             </a:r>
             <a:r>
               <a:rPr lang="en-US" dirty="0" smtClean="0">
@@ -3907,7 +3895,7 @@
 </file>
 
 <file path=ppt/slides/slide11.xml><?xml version="1.0" encoding="utf-8"?>
-<p:sld xmlns:a="http://schemas.openxmlformats.org/drawingml/2006/main" xmlns:r="http://schemas.openxmlformats.org/officeDocument/2006/relationships" xmlns:mc="http://schemas.openxmlformats.org/markup-compatibility/2006" xmlns:mv="urn:schemas-microsoft-com:mac:vml" xmlns:p="http://schemas.openxmlformats.org/presentationml/2006/main" mc:Ignorable="mv" mc:PreserveAttributes="mv:*">
+<p:sld xmlns:a="http://schemas.openxmlformats.org/drawingml/2006/main" xmlns:r="http://schemas.openxmlformats.org/officeDocument/2006/relationships" xmlns:p="http://schemas.openxmlformats.org/presentationml/2006/main">
   <p:cSld>
     <p:bg>
       <p:bgPr>
@@ -4053,7 +4041,7 @@
 </file>
 
 <file path=ppt/slides/slide12.xml><?xml version="1.0" encoding="utf-8"?>
-<p:sld xmlns:a="http://schemas.openxmlformats.org/drawingml/2006/main" xmlns:r="http://schemas.openxmlformats.org/officeDocument/2006/relationships" xmlns:mc="http://schemas.openxmlformats.org/markup-compatibility/2006" xmlns:mv="urn:schemas-microsoft-com:mac:vml" xmlns:p="http://schemas.openxmlformats.org/presentationml/2006/main" mc:Ignorable="mv" mc:PreserveAttributes="mv:*">
+<p:sld xmlns:a="http://schemas.openxmlformats.org/drawingml/2006/main" xmlns:r="http://schemas.openxmlformats.org/officeDocument/2006/relationships" xmlns:p="http://schemas.openxmlformats.org/presentationml/2006/main">
   <p:cSld>
     <p:bg>
       <p:bgPr>
@@ -4147,6 +4135,16 @@
               <a:buChar char="§"/>
             </a:pPr>
             <a:r>
+              <a:rPr lang="en-US" dirty="0">
+                <a:solidFill>
+                  <a:schemeClr val="bg1"/>
+                </a:solidFill>
+                <a:latin typeface="Bell MT"/>
+                <a:cs typeface="Bell MT"/>
+              </a:rPr>
+              <a:t>A</a:t>
+            </a:r>
+            <a:r>
               <a:rPr lang="en-US" dirty="0" smtClean="0">
                 <a:solidFill>
                   <a:schemeClr val="bg1"/>
@@ -4154,7 +4152,27 @@
                 <a:latin typeface="Bell MT"/>
                 <a:cs typeface="Bell MT"/>
               </a:rPr>
-              <a:t>Pseudo random algorithm generates the galaxy procedurally</a:t>
+              <a:t>lgorithm </a:t>
+            </a:r>
+            <a:r>
+              <a:rPr lang="en-US" dirty="0" smtClean="0">
+                <a:solidFill>
+                  <a:schemeClr val="bg1"/>
+                </a:solidFill>
+                <a:latin typeface="Bell MT"/>
+                <a:cs typeface="Bell MT"/>
+              </a:rPr>
+              <a:t>generates the galaxy </a:t>
+            </a:r>
+            <a:r>
+              <a:rPr lang="en-US" dirty="0" smtClean="0">
+                <a:solidFill>
+                  <a:schemeClr val="bg1"/>
+                </a:solidFill>
+                <a:latin typeface="Bell MT"/>
+                <a:cs typeface="Bell MT"/>
+              </a:rPr>
+              <a:t>pseudo-randomly using seed values</a:t>
             </a:r>
             <a:endParaRPr lang="en-US" dirty="0" smtClean="0">
               <a:solidFill>
@@ -4199,7 +4217,27 @@
                 <a:latin typeface="Bell MT"/>
                 <a:cs typeface="Bell MT"/>
               </a:rPr>
-              <a:t>Each element references static info to determine specific attributes</a:t>
+              <a:t>Each element references static </a:t>
+            </a:r>
+            <a:r>
+              <a:rPr lang="en-US" dirty="0" smtClean="0">
+                <a:solidFill>
+                  <a:schemeClr val="bg1"/>
+                </a:solidFill>
+                <a:latin typeface="Bell MT"/>
+                <a:cs typeface="Bell MT"/>
+              </a:rPr>
+              <a:t>information </a:t>
+            </a:r>
+            <a:r>
+              <a:rPr lang="en-US" dirty="0" smtClean="0">
+                <a:solidFill>
+                  <a:schemeClr val="bg1"/>
+                </a:solidFill>
+                <a:latin typeface="Bell MT"/>
+                <a:cs typeface="Bell MT"/>
+              </a:rPr>
+              <a:t>to determine specific attributes</a:t>
             </a:r>
           </a:p>
           <a:p>
@@ -4244,7 +4282,7 @@
 </file>
 
 <file path=ppt/slides/slide13.xml><?xml version="1.0" encoding="utf-8"?>
-<p:sld xmlns:a="http://schemas.openxmlformats.org/drawingml/2006/main" xmlns:r="http://schemas.openxmlformats.org/officeDocument/2006/relationships" xmlns:mc="http://schemas.openxmlformats.org/markup-compatibility/2006" xmlns:mv="urn:schemas-microsoft-com:mac:vml" xmlns:p="http://schemas.openxmlformats.org/presentationml/2006/main" mc:Ignorable="mv" mc:PreserveAttributes="mv:*">
+<p:sld xmlns:a="http://schemas.openxmlformats.org/drawingml/2006/main" xmlns:r="http://schemas.openxmlformats.org/officeDocument/2006/relationships" xmlns:p="http://schemas.openxmlformats.org/presentationml/2006/main">
   <p:cSld>
     <p:bg>
       <p:bgPr>
@@ -4347,6 +4385,35 @@
               </a:rPr>
               <a:t>Buy low, sell high</a:t>
             </a:r>
+          </a:p>
+          <a:p>
+            <a:pPr>
+              <a:buClr>
+                <a:srgbClr val="FF6600"/>
+              </a:buClr>
+              <a:buFont typeface="Wingdings" charset="2"/>
+              <a:buChar char="§"/>
+            </a:pPr>
+            <a:r>
+              <a:rPr lang="en-US" dirty="0" smtClean="0">
+                <a:solidFill>
+                  <a:schemeClr val="bg1"/>
+                </a:solidFill>
+                <a:latin typeface="Bell MT"/>
+                <a:cs typeface="Bell MT"/>
+              </a:rPr>
+              <a:t>A merchant’s inventory is generated as </a:t>
+            </a:r>
+            <a:r>
+              <a:rPr lang="en-US" dirty="0" smtClean="0">
+                <a:solidFill>
+                  <a:schemeClr val="bg1"/>
+                </a:solidFill>
+                <a:latin typeface="Bell MT"/>
+                <a:cs typeface="Bell MT"/>
+              </a:rPr>
+              <a:t>needed</a:t>
+            </a:r>
             <a:endParaRPr lang="en-US" dirty="0" smtClean="0">
               <a:solidFill>
                 <a:schemeClr val="bg1"/>
@@ -4354,25 +4421,6 @@
               <a:latin typeface="Bell MT"/>
               <a:cs typeface="Bell MT"/>
             </a:endParaRPr>
-          </a:p>
-          <a:p>
-            <a:pPr>
-              <a:buClr>
-                <a:srgbClr val="FF6600"/>
-              </a:buClr>
-              <a:buFont typeface="Wingdings" charset="2"/>
-              <a:buChar char="§"/>
-            </a:pPr>
-            <a:r>
-              <a:rPr lang="en-US" dirty="0" smtClean="0">
-                <a:solidFill>
-                  <a:schemeClr val="bg1"/>
-                </a:solidFill>
-                <a:latin typeface="Bell MT"/>
-                <a:cs typeface="Bell MT"/>
-              </a:rPr>
-              <a:t>A merchant’s inventory is generated as needed</a:t>
-            </a:r>
           </a:p>
           <a:p>
             <a:pPr>
@@ -4435,7 +4483,7 @@
 </file>
 
 <file path=ppt/slides/slide14.xml><?xml version="1.0" encoding="utf-8"?>
-<p:sld xmlns:a="http://schemas.openxmlformats.org/drawingml/2006/main" xmlns:r="http://schemas.openxmlformats.org/officeDocument/2006/relationships" xmlns:mc="http://schemas.openxmlformats.org/markup-compatibility/2006" xmlns:mv="urn:schemas-microsoft-com:mac:vml" xmlns:p="http://schemas.openxmlformats.org/presentationml/2006/main" mc:Ignorable="mv" mc:PreserveAttributes="mv:*">
+<p:sld xmlns:a="http://schemas.openxmlformats.org/drawingml/2006/main" xmlns:r="http://schemas.openxmlformats.org/officeDocument/2006/relationships" xmlns:p="http://schemas.openxmlformats.org/presentationml/2006/main">
   <p:cSld>
     <p:bg>
       <p:bgPr>
@@ -4536,17 +4584,7 @@
                 <a:latin typeface="Bell MT"/>
                 <a:cs typeface="Bell MT"/>
               </a:rPr>
-              <a:t>Necessary materials </a:t>
-            </a:r>
-            <a:r>
-              <a:rPr lang="en-US" dirty="0" smtClean="0">
-                <a:solidFill>
-                  <a:schemeClr val="bg1"/>
-                </a:solidFill>
-                <a:latin typeface="Bell MT"/>
-                <a:cs typeface="Bell MT"/>
-              </a:rPr>
-              <a:t>required:</a:t>
+              <a:t>Necessary materials required:</a:t>
             </a:r>
           </a:p>
           <a:p>
@@ -4637,25 +4675,8 @@
                 <a:latin typeface="Bell MT"/>
                 <a:cs typeface="Bell MT"/>
               </a:rPr>
-              <a:t>Use a player’s inventory to </a:t>
-            </a:r>
-            <a:r>
-              <a:rPr lang="en-US" dirty="0" smtClean="0">
-                <a:solidFill>
-                  <a:schemeClr val="bg1"/>
-                </a:solidFill>
-                <a:latin typeface="Bell MT"/>
-                <a:cs typeface="Bell MT"/>
-              </a:rPr>
-              <a:t>repair drive</a:t>
-            </a:r>
-            <a:endParaRPr lang="en-US" dirty="0" smtClean="0">
-              <a:solidFill>
-                <a:schemeClr val="bg1"/>
-              </a:solidFill>
-              <a:latin typeface="Bell MT"/>
-              <a:cs typeface="Bell MT"/>
-            </a:endParaRPr>
+              <a:t>Use a player’s inventory to repair drive</a:t>
+            </a:r>
           </a:p>
           <a:p>
             <a:pPr>
@@ -4773,7 +4794,7 @@
 </file>
 
 <file path=ppt/slides/slide15.xml><?xml version="1.0" encoding="utf-8"?>
-<p:sld xmlns:a="http://schemas.openxmlformats.org/drawingml/2006/main" xmlns:r="http://schemas.openxmlformats.org/officeDocument/2006/relationships" xmlns:mc="http://schemas.openxmlformats.org/markup-compatibility/2006" xmlns:mv="urn:schemas-microsoft-com:mac:vml" xmlns:p="http://schemas.openxmlformats.org/presentationml/2006/main" mc:Ignorable="mv" mc:PreserveAttributes="mv:*">
+<p:sld xmlns:a="http://schemas.openxmlformats.org/drawingml/2006/main" xmlns:r="http://schemas.openxmlformats.org/officeDocument/2006/relationships" xmlns:p="http://schemas.openxmlformats.org/presentationml/2006/main">
   <p:cSld>
     <p:bg>
       <p:bgPr>
@@ -4874,17 +4895,7 @@
                 <a:latin typeface="Bell MT"/>
                 <a:cs typeface="Bell MT"/>
               </a:rPr>
-              <a:t>Necessary materials </a:t>
-            </a:r>
-            <a:r>
-              <a:rPr lang="en-US" dirty="0" smtClean="0">
-                <a:solidFill>
-                  <a:schemeClr val="bg1"/>
-                </a:solidFill>
-                <a:latin typeface="Bell MT"/>
-                <a:cs typeface="Bell MT"/>
-              </a:rPr>
-              <a:t>required:</a:t>
+              <a:t>Necessary materials required:</a:t>
             </a:r>
           </a:p>
           <a:p>
@@ -4975,25 +4986,8 @@
                 <a:latin typeface="Bell MT"/>
                 <a:cs typeface="Bell MT"/>
               </a:rPr>
-              <a:t>Use a player’s inventory to </a:t>
-            </a:r>
-            <a:r>
-              <a:rPr lang="en-US" dirty="0" smtClean="0">
-                <a:solidFill>
-                  <a:schemeClr val="bg1"/>
-                </a:solidFill>
-                <a:latin typeface="Bell MT"/>
-                <a:cs typeface="Bell MT"/>
-              </a:rPr>
-              <a:t>repair drive</a:t>
-            </a:r>
-            <a:endParaRPr lang="en-US" dirty="0" smtClean="0">
-              <a:solidFill>
-                <a:schemeClr val="bg1"/>
-              </a:solidFill>
-              <a:latin typeface="Bell MT"/>
-              <a:cs typeface="Bell MT"/>
-            </a:endParaRPr>
+              <a:t>Use a player’s inventory to repair drive</a:t>
+            </a:r>
           </a:p>
           <a:p>
             <a:pPr>
@@ -5111,7 +5105,7 @@
 </file>
 
 <file path=ppt/slides/slide2.xml><?xml version="1.0" encoding="utf-8"?>
-<p:sld xmlns:a="http://schemas.openxmlformats.org/drawingml/2006/main" xmlns:r="http://schemas.openxmlformats.org/officeDocument/2006/relationships" xmlns:mc="http://schemas.openxmlformats.org/markup-compatibility/2006" xmlns:mv="urn:schemas-microsoft-com:mac:vml" xmlns:p="http://schemas.openxmlformats.org/presentationml/2006/main" mc:Ignorable="mv" mc:PreserveAttributes="mv:*">
+<p:sld xmlns:a="http://schemas.openxmlformats.org/drawingml/2006/main" xmlns:r="http://schemas.openxmlformats.org/officeDocument/2006/relationships" xmlns:p="http://schemas.openxmlformats.org/presentationml/2006/main">
   <p:cSld>
     <p:bg>
       <p:bgPr>
@@ -5205,8 +5199,45 @@
                 <a:latin typeface="Bell MT"/>
                 <a:cs typeface="Bell MT"/>
               </a:rPr>
-              <a:t>The player’s ship suffers from a faulty warp drive during the galactic mapping</a:t>
-            </a:r>
+              <a:t>The player’s ship suffers </a:t>
+            </a:r>
+            <a:r>
+              <a:rPr lang="en-US" dirty="0" smtClean="0">
+                <a:solidFill>
+                  <a:schemeClr val="bg1"/>
+                </a:solidFill>
+                <a:latin typeface="Bell MT"/>
+                <a:cs typeface="Bell MT"/>
+              </a:rPr>
+              <a:t>a failure in the drive systems </a:t>
+            </a:r>
+            <a:r>
+              <a:rPr lang="en-US" dirty="0" smtClean="0">
+                <a:solidFill>
+                  <a:schemeClr val="bg1"/>
+                </a:solidFill>
+                <a:latin typeface="Bell MT"/>
+                <a:cs typeface="Bell MT"/>
+              </a:rPr>
+              <a:t>during </a:t>
+            </a:r>
+            <a:r>
+              <a:rPr lang="en-US" dirty="0" smtClean="0">
+                <a:solidFill>
+                  <a:schemeClr val="bg1"/>
+                </a:solidFill>
+                <a:latin typeface="Bell MT"/>
+                <a:cs typeface="Bell MT"/>
+              </a:rPr>
+              <a:t>intergalactic travel</a:t>
+            </a:r>
+            <a:endParaRPr lang="en-US" dirty="0" smtClean="0">
+              <a:solidFill>
+                <a:schemeClr val="bg1"/>
+              </a:solidFill>
+              <a:latin typeface="Bell MT"/>
+              <a:cs typeface="Bell MT"/>
+            </a:endParaRPr>
           </a:p>
           <a:p>
             <a:pPr>
@@ -5281,7 +5312,7 @@
                 <a:latin typeface="Bell MT"/>
                 <a:cs typeface="Bell MT"/>
               </a:rPr>
-              <a:t>Can trade </a:t>
+              <a:t>Can trade commodities between various ports  in the galaxy where commodities and prices are </a:t>
             </a:r>
             <a:r>
               <a:rPr lang="en-US" sz="2118" dirty="0" smtClean="0">
@@ -5291,7 +5322,7 @@
                 <a:latin typeface="Bell MT"/>
                 <a:cs typeface="Bell MT"/>
               </a:rPr>
-              <a:t>commodities between various ports  in the galaxy where commodities and prices are pseudo randomly </a:t>
+              <a:t>pseudo-randomly </a:t>
             </a:r>
             <a:r>
               <a:rPr lang="en-US" sz="2118" dirty="0" smtClean="0">
@@ -5320,7 +5351,7 @@
                 <a:latin typeface="Bell MT"/>
                 <a:cs typeface="Bell MT"/>
               </a:rPr>
-              <a:t>Has $500 </a:t>
+              <a:t>Starts with $500 </a:t>
             </a:r>
             <a:endParaRPr lang="en-US" sz="2118" dirty="0" smtClean="0">
               <a:solidFill>
@@ -5346,17 +5377,7 @@
                 <a:latin typeface="Bell MT"/>
                 <a:cs typeface="Bell MT"/>
               </a:rPr>
-              <a:t>The player dies if he/she runs out of </a:t>
-            </a:r>
-            <a:r>
-              <a:rPr lang="en-US" dirty="0" smtClean="0">
-                <a:solidFill>
-                  <a:schemeClr val="bg1"/>
-                </a:solidFill>
-                <a:latin typeface="Bell MT"/>
-                <a:cs typeface="Bell MT"/>
-              </a:rPr>
-              <a:t>fuel</a:t>
+              <a:t>The player dies if he/she runs out of fuel</a:t>
             </a:r>
           </a:p>
           <a:p>
@@ -5436,7 +5457,7 @@
 </file>
 
 <file path=ppt/slides/slide3.xml><?xml version="1.0" encoding="utf-8"?>
-<p:sld xmlns:a="http://schemas.openxmlformats.org/drawingml/2006/main" xmlns:r="http://schemas.openxmlformats.org/officeDocument/2006/relationships" xmlns:mc="http://schemas.openxmlformats.org/markup-compatibility/2006" xmlns:mv="urn:schemas-microsoft-com:mac:vml" xmlns:p="http://schemas.openxmlformats.org/presentationml/2006/main" mc:Ignorable="mv" mc:PreserveAttributes="mv:*">
+<p:sld xmlns:a="http://schemas.openxmlformats.org/drawingml/2006/main" xmlns:r="http://schemas.openxmlformats.org/officeDocument/2006/relationships" xmlns:p="http://schemas.openxmlformats.org/presentationml/2006/main">
   <p:cSld>
     <p:bg>
       <p:bgPr>
@@ -5530,13 +5551,6 @@
               </a:rPr>
               <a:t>Interface</a:t>
             </a:r>
-            <a:endParaRPr lang="en-US" dirty="0" smtClean="0">
-              <a:solidFill>
-                <a:schemeClr val="bg1"/>
-              </a:solidFill>
-              <a:latin typeface="Bell MT"/>
-              <a:cs typeface="Bell MT"/>
-            </a:endParaRPr>
           </a:p>
           <a:p>
             <a:pPr lvl="1">
@@ -5735,7 +5749,7 @@
 </file>
 
 <file path=ppt/slides/slide4.xml><?xml version="1.0" encoding="utf-8"?>
-<p:sld xmlns:a="http://schemas.openxmlformats.org/drawingml/2006/main" xmlns:r="http://schemas.openxmlformats.org/officeDocument/2006/relationships" xmlns:mc="http://schemas.openxmlformats.org/markup-compatibility/2006" xmlns:mv="urn:schemas-microsoft-com:mac:vml" xmlns:p="http://schemas.openxmlformats.org/presentationml/2006/main" mc:Ignorable="mv" mc:PreserveAttributes="mv:*">
+<p:sld xmlns:a="http://schemas.openxmlformats.org/drawingml/2006/main" xmlns:r="http://schemas.openxmlformats.org/officeDocument/2006/relationships" xmlns:p="http://schemas.openxmlformats.org/presentationml/2006/main">
   <p:cSld>
     <p:bg>
       <p:bgPr>
@@ -5825,7 +5839,7 @@
 </file>
 
 <file path=ppt/slides/slide5.xml><?xml version="1.0" encoding="utf-8"?>
-<p:sld xmlns:a="http://schemas.openxmlformats.org/drawingml/2006/main" xmlns:r="http://schemas.openxmlformats.org/officeDocument/2006/relationships" xmlns:mc="http://schemas.openxmlformats.org/markup-compatibility/2006" xmlns:mv="urn:schemas-microsoft-com:mac:vml" xmlns:p="http://schemas.openxmlformats.org/presentationml/2006/main" mc:Ignorable="mv" mc:PreserveAttributes="mv:*">
+<p:sld xmlns:a="http://schemas.openxmlformats.org/drawingml/2006/main" xmlns:r="http://schemas.openxmlformats.org/officeDocument/2006/relationships" xmlns:p="http://schemas.openxmlformats.org/presentationml/2006/main">
   <p:cSld>
     <p:bg>
       <p:bgPr>
@@ -5920,7 +5934,7 @@
 </file>
 
 <file path=ppt/slides/slide6.xml><?xml version="1.0" encoding="utf-8"?>
-<p:sld xmlns:a="http://schemas.openxmlformats.org/drawingml/2006/main" xmlns:r="http://schemas.openxmlformats.org/officeDocument/2006/relationships" xmlns:mc="http://schemas.openxmlformats.org/markup-compatibility/2006" xmlns:mv="urn:schemas-microsoft-com:mac:vml" xmlns:p="http://schemas.openxmlformats.org/presentationml/2006/main" mc:Ignorable="mv" mc:PreserveAttributes="mv:*">
+<p:sld xmlns:a="http://schemas.openxmlformats.org/drawingml/2006/main" xmlns:r="http://schemas.openxmlformats.org/officeDocument/2006/relationships" xmlns:p="http://schemas.openxmlformats.org/presentationml/2006/main">
   <p:cSld>
     <p:bg>
       <p:bgPr>
@@ -5977,17 +5991,7 @@
                 <a:latin typeface="Bauhaus 93"/>
                 <a:cs typeface="Bauhaus 93"/>
               </a:rPr>
-              <a:t>Interface: Navigating </a:t>
-            </a:r>
-            <a:r>
-              <a:rPr lang="en-US" sz="3600" dirty="0" smtClean="0">
-                <a:solidFill>
-                  <a:srgbClr val="FF6600"/>
-                </a:solidFill>
-                <a:latin typeface="Bauhaus 93"/>
-                <a:cs typeface="Bauhaus 93"/>
-              </a:rPr>
-              <a:t>through the Galaxy</a:t>
+              <a:t>Interface: Navigating through the Galaxy</a:t>
             </a:r>
             <a:endParaRPr lang="en-US" sz="3600" dirty="0">
               <a:solidFill>
@@ -6109,17 +6113,7 @@
                 <a:latin typeface="Bell MT"/>
                 <a:cs typeface="Bell MT"/>
               </a:rPr>
-              <a:t>T</a:t>
-            </a:r>
-            <a:r>
-              <a:rPr lang="en-US" dirty="0" smtClean="0">
-                <a:solidFill>
-                  <a:schemeClr val="bg1"/>
-                </a:solidFill>
-                <a:latin typeface="Bell MT"/>
-                <a:cs typeface="Bell MT"/>
-              </a:rPr>
-              <a:t>he </a:t>
+              <a:t>The </a:t>
             </a:r>
             <a:r>
               <a:rPr lang="en-US" i="1" dirty="0" smtClean="0">
@@ -6160,13 +6154,6 @@
               </a:rPr>
               <a:t>Navigation markers are used to navigate above the Star System level</a:t>
             </a:r>
-            <a:endParaRPr lang="en-US" dirty="0" smtClean="0">
-              <a:solidFill>
-                <a:schemeClr val="bg1"/>
-              </a:solidFill>
-              <a:latin typeface="Bell MT"/>
-              <a:cs typeface="Bell MT"/>
-            </a:endParaRPr>
           </a:p>
           <a:p>
             <a:pPr>
@@ -6194,7 +6181,7 @@
 </file>
 
 <file path=ppt/slides/slide7.xml><?xml version="1.0" encoding="utf-8"?>
-<p:sld xmlns:a="http://schemas.openxmlformats.org/drawingml/2006/main" xmlns:r="http://schemas.openxmlformats.org/officeDocument/2006/relationships" xmlns:mc="http://schemas.openxmlformats.org/markup-compatibility/2006" xmlns:mv="urn:schemas-microsoft-com:mac:vml" xmlns:p="http://schemas.openxmlformats.org/presentationml/2006/main" mc:Ignorable="mv" mc:PreserveAttributes="mv:*">
+<p:sld xmlns:a="http://schemas.openxmlformats.org/drawingml/2006/main" xmlns:r="http://schemas.openxmlformats.org/officeDocument/2006/relationships" xmlns:p="http://schemas.openxmlformats.org/presentationml/2006/main">
   <p:cSld>
     <p:bg>
       <p:bgPr>
@@ -6251,27 +6238,7 @@
                 <a:latin typeface="Bauhaus 93"/>
                 <a:cs typeface="Bauhaus 93"/>
               </a:rPr>
-              <a:t>Interface: Navigating </a:t>
-            </a:r>
-            <a:r>
-              <a:rPr lang="en-US" dirty="0" smtClean="0">
-                <a:solidFill>
-                  <a:srgbClr val="FF6600"/>
-                </a:solidFill>
-                <a:latin typeface="Bauhaus 93"/>
-                <a:cs typeface="Bauhaus 93"/>
-              </a:rPr>
-              <a:t>through the </a:t>
-            </a:r>
-            <a:r>
-              <a:rPr lang="en-US" dirty="0" smtClean="0">
-                <a:solidFill>
-                  <a:srgbClr val="FF6600"/>
-                </a:solidFill>
-                <a:latin typeface="Bauhaus 93"/>
-                <a:cs typeface="Bauhaus 93"/>
-              </a:rPr>
-              <a:t>Galaxy (Cont.)</a:t>
+              <a:t>Interface: Navigating through the Galaxy (Cont.)</a:t>
             </a:r>
             <a:endParaRPr lang="en-US" dirty="0">
               <a:solidFill>
@@ -6311,7 +6278,7 @@
 </file>
 
 <file path=ppt/slides/slide8.xml><?xml version="1.0" encoding="utf-8"?>
-<p:sld xmlns:a="http://schemas.openxmlformats.org/drawingml/2006/main" xmlns:r="http://schemas.openxmlformats.org/officeDocument/2006/relationships" xmlns:mc="http://schemas.openxmlformats.org/markup-compatibility/2006" xmlns:mv="urn:schemas-microsoft-com:mac:vml" xmlns:p="http://schemas.openxmlformats.org/presentationml/2006/main" mc:Ignorable="mv" mc:PreserveAttributes="mv:*">
+<p:sld xmlns:a="http://schemas.openxmlformats.org/drawingml/2006/main" xmlns:r="http://schemas.openxmlformats.org/officeDocument/2006/relationships" xmlns:p="http://schemas.openxmlformats.org/presentationml/2006/main">
   <p:cSld>
     <p:bg>
       <p:bgPr>
@@ -6407,13 +6374,6 @@
               </a:rPr>
               <a:t>Trading Menu is displayed when a navigation marker is pressed</a:t>
             </a:r>
-            <a:endParaRPr lang="en-US" dirty="0" smtClean="0">
-              <a:solidFill>
-                <a:schemeClr val="bg1"/>
-              </a:solidFill>
-              <a:latin typeface="Bell MT"/>
-              <a:cs typeface="Bell MT"/>
-            </a:endParaRPr>
           </a:p>
           <a:p>
             <a:pPr lvl="1">
@@ -6441,17 +6401,7 @@
                 <a:latin typeface="Bell MT"/>
                 <a:cs typeface="Bell MT"/>
               </a:rPr>
-              <a:t>B</a:t>
-            </a:r>
-            <a:r>
-              <a:rPr lang="en-US" sz="2400" i="1" dirty="0" smtClean="0">
-                <a:solidFill>
-                  <a:schemeClr val="bg1"/>
-                </a:solidFill>
-                <a:latin typeface="Bell MT"/>
-                <a:cs typeface="Bell MT"/>
-              </a:rPr>
-              <a:t>ack</a:t>
+              <a:t>Back</a:t>
             </a:r>
             <a:r>
               <a:rPr lang="en-US" sz="2400" dirty="0" smtClean="0">
@@ -6492,16 +6442,6 @@
               <a:buChar char="ü"/>
             </a:pPr>
             <a:r>
-              <a:rPr lang="en-US" sz="2400" dirty="0" err="1" smtClean="0">
-                <a:solidFill>
-                  <a:schemeClr val="bg1"/>
-                </a:solidFill>
-                <a:latin typeface="Bell MT"/>
-                <a:cs typeface="Bell MT"/>
-              </a:rPr>
-              <a:t>JList</a:t>
-            </a:r>
-            <a:r>
               <a:rPr lang="en-US" sz="2400" dirty="0" smtClean="0">
                 <a:solidFill>
                   <a:schemeClr val="bg1"/>
@@ -6509,7 +6449,17 @@
                 <a:latin typeface="Bell MT"/>
                 <a:cs typeface="Bell MT"/>
               </a:rPr>
-              <a:t> of a merchant’s inventory</a:t>
+              <a:t>List </a:t>
+            </a:r>
+            <a:r>
+              <a:rPr lang="en-US" sz="2400" dirty="0" smtClean="0">
+                <a:solidFill>
+                  <a:schemeClr val="bg1"/>
+                </a:solidFill>
+                <a:latin typeface="Bell MT"/>
+                <a:cs typeface="Bell MT"/>
+              </a:rPr>
+              <a:t>of a merchant’s inventory</a:t>
             </a:r>
           </a:p>
           <a:p>
@@ -6521,16 +6471,6 @@
               <a:buChar char="ü"/>
             </a:pPr>
             <a:r>
-              <a:rPr lang="en-US" sz="2400" dirty="0" err="1" smtClean="0">
-                <a:solidFill>
-                  <a:schemeClr val="bg1"/>
-                </a:solidFill>
-                <a:latin typeface="Bell MT"/>
-                <a:cs typeface="Bell MT"/>
-              </a:rPr>
-              <a:t>JList</a:t>
-            </a:r>
-            <a:r>
               <a:rPr lang="en-US" sz="2400" dirty="0" smtClean="0">
                 <a:solidFill>
                   <a:schemeClr val="bg1"/>
@@ -6538,7 +6478,17 @@
                 <a:latin typeface="Bell MT"/>
                 <a:cs typeface="Bell MT"/>
               </a:rPr>
-              <a:t> of a player’s inventory</a:t>
+              <a:t>List </a:t>
+            </a:r>
+            <a:r>
+              <a:rPr lang="en-US" sz="2400" dirty="0" smtClean="0">
+                <a:solidFill>
+                  <a:schemeClr val="bg1"/>
+                </a:solidFill>
+                <a:latin typeface="Bell MT"/>
+                <a:cs typeface="Bell MT"/>
+              </a:rPr>
+              <a:t>of a player’s inventory</a:t>
             </a:r>
           </a:p>
           <a:p>
@@ -6560,14 +6510,14 @@
               <a:t>Buy, Sell, Leave </a:t>
             </a:r>
             <a:r>
-              <a:rPr lang="en-US" sz="2400" dirty="0" err="1" smtClean="0">
-                <a:solidFill>
-                  <a:schemeClr val="bg1"/>
-                </a:solidFill>
-                <a:latin typeface="Bell MT"/>
-                <a:cs typeface="Bell MT"/>
-              </a:rPr>
-              <a:t>JButtons</a:t>
+              <a:rPr lang="en-US" sz="2400" dirty="0" smtClean="0">
+                <a:solidFill>
+                  <a:schemeClr val="bg1"/>
+                </a:solidFill>
+                <a:latin typeface="Bell MT"/>
+                <a:cs typeface="Bell MT"/>
+              </a:rPr>
+              <a:t>Buttons</a:t>
             </a:r>
             <a:endParaRPr lang="en-US" sz="2400" dirty="0" smtClean="0">
               <a:solidFill>
@@ -6619,7 +6569,7 @@
 </file>
 
 <file path=ppt/slides/slide9.xml><?xml version="1.0" encoding="utf-8"?>
-<p:sld xmlns:a="http://schemas.openxmlformats.org/drawingml/2006/main" xmlns:r="http://schemas.openxmlformats.org/officeDocument/2006/relationships" xmlns:mc="http://schemas.openxmlformats.org/markup-compatibility/2006" xmlns:mv="urn:schemas-microsoft-com:mac:vml" xmlns:p="http://schemas.openxmlformats.org/presentationml/2006/main" mc:Ignorable="mv" mc:PreserveAttributes="mv:*">
+<p:sld xmlns:a="http://schemas.openxmlformats.org/drawingml/2006/main" xmlns:r="http://schemas.openxmlformats.org/officeDocument/2006/relationships" xmlns:p="http://schemas.openxmlformats.org/presentationml/2006/main">
   <p:cSld>
     <p:bg>
       <p:bgPr>
@@ -6676,17 +6626,7 @@
                 <a:latin typeface="Bauhaus 93"/>
                 <a:cs typeface="Bauhaus 93"/>
               </a:rPr>
-              <a:t>Interface: </a:t>
-            </a:r>
-            <a:r>
-              <a:rPr lang="en-US" dirty="0" smtClean="0">
-                <a:solidFill>
-                  <a:srgbClr val="FF6600"/>
-                </a:solidFill>
-                <a:latin typeface="Bauhaus 93"/>
-                <a:cs typeface="Bauhaus 93"/>
-              </a:rPr>
-              <a:t>Trading (Cont.)</a:t>
+              <a:t>Interface: Trading (Cont.)</a:t>
             </a:r>
             <a:endParaRPr lang="en-US" dirty="0">
               <a:solidFill>

</xml_diff>